<commit_message>
added result for ebm
</commit_message>
<xml_diff>
--- a/raw_source/Seminar1.pptx
+++ b/raw_source/Seminar1.pptx
@@ -3051,7 +3051,7 @@
         </p:blipFill>
         <p:spPr bwMode="auto">
           <a:xfrm>
-            <a:off x="9913409" y="396875"/>
+            <a:off x="1524000" y="588963"/>
             <a:ext cx="1609725" cy="533400"/>
           </a:xfrm>
           <a:prstGeom prst="rect">
@@ -3088,12 +3088,27 @@
         </p:nvSpPr>
         <p:spPr/>
         <p:txBody>
-          <a:bodyPr/>
+          <a:bodyPr>
+            <a:normAutofit lnSpcReduction="10000"/>
+          </a:bodyPr>
           <a:lstStyle/>
           <a:p>
             <a:r>
               <a:rPr lang="en-GB" dirty="0" smtClean="0"/>
-              <a:t>Developing and Evaluating an Interpretable Learning to Rank Model for Resume Enhancement</a:t>
+              <a:t>Developing and Evaluating an Interpretable Learning to Rank Model for Resume </a:t>
+            </a:r>
+            <a:r>
+              <a:rPr lang="en-GB" dirty="0" smtClean="0"/>
+              <a:t>Enhancement</a:t>
+            </a:r>
+          </a:p>
+          <a:p>
+            <a:endParaRPr lang="en-GB" dirty="0" smtClean="0"/>
+          </a:p>
+          <a:p>
+            <a:r>
+              <a:rPr lang="en-GB" dirty="0" smtClean="0"/>
+              <a:t>Iommi Andrea</a:t>
             </a:r>
             <a:endParaRPr lang="en-GB" dirty="0"/>
           </a:p>
@@ -4093,6 +4108,90 @@
           </a:prstGeom>
         </p:spPr>
       </p:pic>
+      <p:sp>
+        <p:nvSpPr>
+          <p:cNvPr id="3" name="CasellaDiTesto 2"/>
+          <p:cNvSpPr txBox="1"/>
+          <p:nvPr/>
+        </p:nvSpPr>
+        <p:spPr>
+          <a:xfrm>
+            <a:off x="5387975" y="1633120"/>
+            <a:ext cx="1985865" cy="369332"/>
+          </a:xfrm>
+          <a:prstGeom prst="rect">
+            <a:avLst/>
+          </a:prstGeom>
+          <a:noFill/>
+        </p:spPr>
+        <p:txBody>
+          <a:bodyPr wrap="none" rtlCol="0">
+            <a:spAutoFit/>
+          </a:bodyPr>
+          <a:lstStyle/>
+          <a:p>
+            <a:r>
+              <a:rPr lang="en-GB" dirty="0" smtClean="0"/>
+              <a:t>Simple intersection</a:t>
+            </a:r>
+            <a:endParaRPr lang="en-GB" dirty="0"/>
+          </a:p>
+        </p:txBody>
+      </p:sp>
+      <p:pic>
+        <p:nvPicPr>
+          <p:cNvPr id="5" name="Immagine 4"/>
+          <p:cNvPicPr>
+            <a:picLocks noChangeAspect="1"/>
+          </p:cNvPicPr>
+          <p:nvPr/>
+        </p:nvPicPr>
+        <p:blipFill>
+          <a:blip r:embed="rId4"/>
+          <a:stretch>
+            <a:fillRect/>
+          </a:stretch>
+        </p:blipFill>
+        <p:spPr>
+          <a:xfrm>
+            <a:off x="6811639" y="3696229"/>
+            <a:ext cx="5283257" cy="1581150"/>
+          </a:xfrm>
+          <a:prstGeom prst="rect">
+            <a:avLst/>
+          </a:prstGeom>
+        </p:spPr>
+      </p:pic>
+      <p:sp>
+        <p:nvSpPr>
+          <p:cNvPr id="6" name="CasellaDiTesto 5"/>
+          <p:cNvSpPr txBox="1"/>
+          <p:nvPr/>
+        </p:nvSpPr>
+        <p:spPr>
+          <a:xfrm>
+            <a:off x="6811639" y="3326897"/>
+            <a:ext cx="1441100" cy="369332"/>
+          </a:xfrm>
+          <a:prstGeom prst="rect">
+            <a:avLst/>
+          </a:prstGeom>
+          <a:noFill/>
+        </p:spPr>
+        <p:txBody>
+          <a:bodyPr wrap="none" rtlCol="0">
+            <a:spAutoFit/>
+          </a:bodyPr>
+          <a:lstStyle/>
+          <a:p>
+            <a:r>
+              <a:rPr lang="en-GB" dirty="0" smtClean="0"/>
+              <a:t>Age function:</a:t>
+            </a:r>
+            <a:endParaRPr lang="en-GB" dirty="0"/>
+          </a:p>
+        </p:txBody>
+      </p:sp>
     </p:spTree>
     <p:extLst>
       <p:ext uri="{BB962C8B-B14F-4D97-AF65-F5344CB8AC3E}">
@@ -4566,6 +4665,36 @@
           </a:p>
         </p:txBody>
       </p:sp>
+      <p:sp>
+        <p:nvSpPr>
+          <p:cNvPr id="5" name="CasellaDiTesto 4"/>
+          <p:cNvSpPr txBox="1"/>
+          <p:nvPr/>
+        </p:nvSpPr>
+        <p:spPr>
+          <a:xfrm>
+            <a:off x="5387975" y="1689738"/>
+            <a:ext cx="2663853" cy="369332"/>
+          </a:xfrm>
+          <a:prstGeom prst="rect">
+            <a:avLst/>
+          </a:prstGeom>
+          <a:noFill/>
+        </p:spPr>
+        <p:txBody>
+          <a:bodyPr wrap="square" rtlCol="0">
+            <a:spAutoFit/>
+          </a:bodyPr>
+          <a:lstStyle/>
+          <a:p>
+            <a:r>
+              <a:rPr lang="en-GB" dirty="0" smtClean="0"/>
+              <a:t>Simple intersection</a:t>
+            </a:r>
+            <a:endParaRPr lang="en-GB" dirty="0"/>
+          </a:p>
+        </p:txBody>
+      </p:sp>
     </p:spTree>
     <p:extLst>
       <p:ext uri="{BB962C8B-B14F-4D97-AF65-F5344CB8AC3E}">
@@ -4576,6 +4705,13 @@
   <p:clrMapOvr>
     <a:masterClrMapping/>
   </p:clrMapOvr>
+  <p:timing>
+    <p:tnLst>
+      <p:par>
+        <p:cTn id="1" dur="indefinite" restart="never" nodeType="tmRoot"/>
+      </p:par>
+    </p:tnLst>
+  </p:timing>
 </p:sld>
 </file>
 
@@ -4653,6 +4789,13 @@
   <p:clrMapOvr>
     <a:masterClrMapping/>
   </p:clrMapOvr>
+  <p:timing>
+    <p:tnLst>
+      <p:par>
+        <p:cTn id="1" dur="indefinite" restart="never" nodeType="tmRoot"/>
+      </p:par>
+    </p:tnLst>
+  </p:timing>
 </p:sld>
 </file>
 
@@ -5179,6 +5322,13 @@
   <p:clrMapOvr>
     <a:masterClrMapping/>
   </p:clrMapOvr>
+  <p:timing>
+    <p:tnLst>
+      <p:par>
+        <p:cTn id="1" dur="indefinite" restart="never" nodeType="tmRoot"/>
+      </p:par>
+    </p:tnLst>
+  </p:timing>
 </p:sld>
 </file>
 
@@ -5360,7 +5510,7 @@
         </p:blipFill>
         <p:spPr>
           <a:xfrm>
-            <a:off x="0" y="0"/>
+            <a:off x="3011855" y="0"/>
             <a:ext cx="4859867" cy="3029160"/>
           </a:xfrm>
           <a:prstGeom prst="rect">
@@ -5384,7 +5534,7 @@
         </p:blipFill>
         <p:spPr>
           <a:xfrm>
-            <a:off x="4859867" y="0"/>
+            <a:off x="7871722" y="0"/>
             <a:ext cx="4320278" cy="3029160"/>
           </a:xfrm>
           <a:prstGeom prst="rect">
@@ -5408,7 +5558,7 @@
         </p:blipFill>
         <p:spPr>
           <a:xfrm>
-            <a:off x="603778" y="3137429"/>
+            <a:off x="3615633" y="3137429"/>
             <a:ext cx="3838575" cy="3343275"/>
           </a:xfrm>
           <a:prstGeom prst="rect">
@@ -5432,7 +5582,7 @@
         </p:blipFill>
         <p:spPr>
           <a:xfrm>
-            <a:off x="5367418" y="3427412"/>
+            <a:off x="8379273" y="3427412"/>
             <a:ext cx="3305175" cy="2390775"/>
           </a:xfrm>
           <a:prstGeom prst="rect">
@@ -5440,6 +5590,66 @@
           </a:prstGeom>
         </p:spPr>
       </p:pic>
+      <p:sp>
+        <p:nvSpPr>
+          <p:cNvPr id="2" name="CasellaDiTesto 1"/>
+          <p:cNvSpPr txBox="1"/>
+          <p:nvPr/>
+        </p:nvSpPr>
+        <p:spPr>
+          <a:xfrm>
+            <a:off x="898644" y="868249"/>
+            <a:ext cx="1032655" cy="646331"/>
+          </a:xfrm>
+          <a:prstGeom prst="rect">
+            <a:avLst/>
+          </a:prstGeom>
+          <a:noFill/>
+        </p:spPr>
+        <p:txBody>
+          <a:bodyPr wrap="none" rtlCol="0">
+            <a:spAutoFit/>
+          </a:bodyPr>
+          <a:lstStyle/>
+          <a:p>
+            <a:r>
+              <a:rPr lang="en-GB" sz="3600" b="1" dirty="0" smtClean="0"/>
+              <a:t>FIGS</a:t>
+            </a:r>
+            <a:endParaRPr lang="en-GB" sz="3600" b="1" dirty="0"/>
+          </a:p>
+        </p:txBody>
+      </p:sp>
+      <p:sp>
+        <p:nvSpPr>
+          <p:cNvPr id="3" name="CasellaDiTesto 2"/>
+          <p:cNvSpPr txBox="1"/>
+          <p:nvPr/>
+        </p:nvSpPr>
+        <p:spPr>
+          <a:xfrm>
+            <a:off x="6996706" y="0"/>
+            <a:ext cx="1750031" cy="369332"/>
+          </a:xfrm>
+          <a:prstGeom prst="rect">
+            <a:avLst/>
+          </a:prstGeom>
+          <a:noFill/>
+        </p:spPr>
+        <p:txBody>
+          <a:bodyPr wrap="none" rtlCol="0">
+            <a:spAutoFit/>
+          </a:bodyPr>
+          <a:lstStyle/>
+          <a:p>
+            <a:r>
+              <a:rPr lang="en-GB" dirty="0" smtClean="0"/>
+              <a:t>Example of trees</a:t>
+            </a:r>
+            <a:endParaRPr lang="en-GB" dirty="0"/>
+          </a:p>
+        </p:txBody>
+      </p:sp>
     </p:spTree>
     <p:extLst>
       <p:ext uri="{BB962C8B-B14F-4D97-AF65-F5344CB8AC3E}">
@@ -5450,6 +5660,13 @@
   <p:clrMapOvr>
     <a:masterClrMapping/>
   </p:clrMapOvr>
+  <p:timing>
+    <p:tnLst>
+      <p:par>
+        <p:cTn id="1" dur="indefinite" restart="never" nodeType="tmRoot"/>
+      </p:par>
+    </p:tnLst>
+  </p:timing>
 </p:sld>
 </file>
 
@@ -11115,6 +11332,36 @@
           </a:graphicData>
         </a:graphic>
       </p:graphicFrame>
+      <p:sp>
+        <p:nvSpPr>
+          <p:cNvPr id="4" name="CasellaDiTesto 3"/>
+          <p:cNvSpPr txBox="1"/>
+          <p:nvPr/>
+        </p:nvSpPr>
+        <p:spPr>
+          <a:xfrm>
+            <a:off x="6358466" y="5289741"/>
+            <a:ext cx="3948068" cy="369332"/>
+          </a:xfrm>
+          <a:prstGeom prst="rect">
+            <a:avLst/>
+          </a:prstGeom>
+          <a:noFill/>
+        </p:spPr>
+        <p:txBody>
+          <a:bodyPr wrap="none" rtlCol="0">
+            <a:spAutoFit/>
+          </a:bodyPr>
+          <a:lstStyle/>
+          <a:p>
+            <a:r>
+              <a:rPr lang="en-GB" dirty="0" smtClean="0"/>
+              <a:t>“Value” as normalized into probabilities.</a:t>
+            </a:r>
+            <a:endParaRPr lang="en-GB" dirty="0"/>
+          </a:p>
+        </p:txBody>
+      </p:sp>
     </p:spTree>
     <p:extLst>
       <p:ext uri="{BB962C8B-B14F-4D97-AF65-F5344CB8AC3E}">
@@ -14419,7 +14666,7 @@
             <p:ph idx="1"/>
             <p:extLst>
               <p:ext uri="{D42A27DB-BD31-4B8C-83A1-F6EECF244321}">
-                <p14:modId xmlns:p14="http://schemas.microsoft.com/office/powerpoint/2010/main" val="2470264052"/>
+                <p14:modId xmlns:p14="http://schemas.microsoft.com/office/powerpoint/2010/main" val="1028478523"/>
               </p:ext>
             </p:extLst>
           </p:nvPr>
@@ -14574,27 +14821,206 @@
                       <a:pPr algn="ctr"/>
                       <a:r>
                         <a:rPr lang="en-GB" sz="1400" dirty="0" smtClean="0"/>
-                        <a:t>rnd</a:t>
+                        <a:t>Random from</a:t>
                       </a:r>
                       <a:r>
                         <a:rPr lang="en-GB" sz="1400" baseline="0" dirty="0" smtClean="0"/>
                         <a:t> </a:t>
                       </a:r>
                       <a:r>
+                        <a:rPr lang="en-GB" sz="1400" baseline="0" dirty="0" smtClean="0"/>
+                        <a:t>distribution </a:t>
+                      </a:r>
+                      <a:r>
                         <a:rPr lang="en-GB" sz="1400" dirty="0" smtClean="0"/>
-                        <a:t>from</a:t>
+                        <a:t>(consistent with</a:t>
                       </a:r>
                       <a:r>
                         <a:rPr lang="en-GB" sz="1400" baseline="0" dirty="0" smtClean="0"/>
                         <a:t> </a:t>
                       </a:r>
                       <a:r>
+                        <a:rPr lang="en-GB" sz="1400" b="1" baseline="0" dirty="0" smtClean="0"/>
+                        <a:t>job</a:t>
+                      </a:r>
+                      <a:r>
+                        <a:rPr lang="en-GB" sz="1400" dirty="0" smtClean="0"/>
+                        <a:t>)</a:t>
+                      </a:r>
+                      <a:endParaRPr lang="en-GB" sz="1400" dirty="0"/>
+                    </a:p>
+                  </a:txBody>
+                  <a:tcPr/>
+                </a:tc>
+                <a:tc>
+                  <a:txBody>
+                    <a:bodyPr/>
+                    <a:lstStyle/>
+                    <a:p>
+                      <a:pPr algn="ctr"/>
+                      <a:endParaRPr lang="en-GB" sz="1400" dirty="0"/>
+                    </a:p>
+                  </a:txBody>
+                  <a:tcPr/>
+                </a:tc>
+                <a:tc>
+                  <a:txBody>
+                    <a:bodyPr/>
+                    <a:lstStyle/>
+                    <a:p>
+                      <a:pPr algn="ctr"/>
+                      <a:endParaRPr lang="en-GB" sz="1400" dirty="0"/>
+                    </a:p>
+                  </a:txBody>
+                  <a:tcPr/>
+                </a:tc>
+              </a:tr>
+              <a:tr h="370840">
+                <a:tc>
+                  <a:txBody>
+                    <a:bodyPr/>
+                    <a:lstStyle/>
+                    <a:p>
+                      <a:r>
+                        <a:rPr lang="en-GB" b="1" dirty="0" smtClean="0"/>
+                        <a:t>City</a:t>
+                      </a:r>
+                      <a:endParaRPr lang="en-GB" b="1" dirty="0"/>
+                    </a:p>
+                  </a:txBody>
+                  <a:tcPr/>
+                </a:tc>
+                <a:tc>
+                  <a:txBody>
+                    <a:bodyPr/>
+                    <a:lstStyle/>
+                    <a:p>
+                      <a:pPr algn="ctr"/>
+                      <a:r>
+                        <a:rPr lang="en-GB" sz="1400" dirty="0" smtClean="0"/>
+                        <a:t>simple</a:t>
+                      </a:r>
+                      <a:r>
                         <a:rPr lang="en-GB" sz="1400" baseline="0" dirty="0" smtClean="0"/>
-                        <a:t>distribution </a:t>
-                      </a:r>
+                        <a:t> random</a:t>
+                      </a:r>
+                      <a:endParaRPr lang="en-GB" sz="1400" dirty="0"/>
+                    </a:p>
+                  </a:txBody>
+                  <a:tcPr/>
+                </a:tc>
+                <a:tc>
+                  <a:txBody>
+                    <a:bodyPr/>
+                    <a:lstStyle/>
+                    <a:p>
+                      <a:pPr algn="ctr"/>
+                      <a:endParaRPr lang="en-GB" sz="1400" dirty="0"/>
+                    </a:p>
+                  </a:txBody>
+                  <a:tcPr/>
+                </a:tc>
+                <a:tc>
+                  <a:txBody>
+                    <a:bodyPr/>
+                    <a:lstStyle/>
+                    <a:p>
+                      <a:pPr algn="ctr"/>
+                      <a:endParaRPr lang="en-GB" sz="1400"/>
+                    </a:p>
+                  </a:txBody>
+                  <a:tcPr/>
+                </a:tc>
+              </a:tr>
+              <a:tr h="370840">
+                <a:tc>
+                  <a:txBody>
+                    <a:bodyPr/>
+                    <a:lstStyle/>
+                    <a:p>
+                      <a:r>
+                        <a:rPr lang="en-GB" b="1" dirty="0" smtClean="0"/>
+                        <a:t>Job-range</a:t>
+                      </a:r>
+                      <a:endParaRPr lang="en-GB" b="1" dirty="0"/>
+                    </a:p>
+                  </a:txBody>
+                  <a:tcPr/>
+                </a:tc>
+                <a:tc>
+                  <a:txBody>
+                    <a:bodyPr/>
+                    <a:lstStyle/>
+                    <a:p>
+                      <a:pPr algn="ctr"/>
                       <a:r>
                         <a:rPr lang="en-GB" sz="1400" dirty="0" smtClean="0"/>
-                        <a:t>(consistent with</a:t>
+                        <a:t>random</a:t>
+                      </a:r>
+                      <a:endParaRPr lang="en-GB" sz="1400" dirty="0"/>
+                    </a:p>
+                  </a:txBody>
+                  <a:tcPr/>
+                </a:tc>
+                <a:tc>
+                  <a:txBody>
+                    <a:bodyPr/>
+                    <a:lstStyle/>
+                    <a:p>
+                      <a:pPr algn="ctr"/>
+                      <a:r>
+                        <a:rPr lang="en-GB" sz="1400" dirty="0" smtClean="0"/>
+                        <a:t>30</a:t>
+                      </a:r>
+                      <a:endParaRPr lang="en-GB" sz="1400" dirty="0"/>
+                    </a:p>
+                  </a:txBody>
+                  <a:tcPr/>
+                </a:tc>
+                <a:tc>
+                  <a:txBody>
+                    <a:bodyPr/>
+                    <a:lstStyle/>
+                    <a:p>
+                      <a:pPr algn="ctr"/>
+                      <a:r>
+                        <a:rPr lang="en-GB" sz="1400" dirty="0" smtClean="0"/>
+                        <a:t>160</a:t>
+                      </a:r>
+                      <a:endParaRPr lang="en-GB" sz="1400" dirty="0"/>
+                    </a:p>
+                  </a:txBody>
+                  <a:tcPr/>
+                </a:tc>
+              </a:tr>
+              <a:tr h="370840">
+                <a:tc>
+                  <a:txBody>
+                    <a:bodyPr/>
+                    <a:lstStyle/>
+                    <a:p>
+                      <a:r>
+                        <a:rPr lang="en-GB" b="1" dirty="0" smtClean="0"/>
+                        <a:t>Skills</a:t>
+                      </a:r>
+                      <a:r>
+                        <a:rPr lang="en-GB" b="1" baseline="0" dirty="0" smtClean="0"/>
+                        <a:t> </a:t>
+                      </a:r>
+                      <a:endParaRPr lang="en-GB" b="1" dirty="0"/>
+                    </a:p>
+                  </a:txBody>
+                  <a:tcPr/>
+                </a:tc>
+                <a:tc>
+                  <a:txBody>
+                    <a:bodyPr/>
+                    <a:lstStyle/>
+                    <a:p>
+                      <a:pPr algn="ctr"/>
+                      <a:r>
+                        <a:rPr lang="en-GB" sz="1400" dirty="0" smtClean="0"/>
+                        <a:t>random (consistent with</a:t>
                       </a:r>
                       <a:r>
                         <a:rPr lang="en-GB" sz="1400" baseline="0" dirty="0" smtClean="0"/>
@@ -14619,6 +15045,10 @@
                     <a:lstStyle/>
                     <a:p>
                       <a:pPr algn="ctr"/>
+                      <a:r>
+                        <a:rPr lang="en-GB" sz="1400" dirty="0" smtClean="0"/>
+                        <a:t>1</a:t>
+                      </a:r>
                       <a:endParaRPr lang="en-GB" sz="1400" dirty="0"/>
                     </a:p>
                   </a:txBody>
@@ -14630,6 +15060,10 @@
                     <a:lstStyle/>
                     <a:p>
                       <a:pPr algn="ctr"/>
+                      <a:r>
+                        <a:rPr lang="en-GB" sz="1400" dirty="0" smtClean="0"/>
+                        <a:t>5</a:t>
+                      </a:r>
                       <a:endParaRPr lang="en-GB" sz="1400" dirty="0"/>
                     </a:p>
                   </a:txBody>
@@ -14644,7 +15078,11 @@
                     <a:p>
                       <a:r>
                         <a:rPr lang="en-GB" b="1" dirty="0" smtClean="0"/>
-                        <a:t>City</a:t>
+                        <a:t>Soft</a:t>
+                      </a:r>
+                      <a:r>
+                        <a:rPr lang="en-GB" b="1" baseline="0" dirty="0" smtClean="0"/>
+                        <a:t> skills</a:t>
                       </a:r>
                       <a:endParaRPr lang="en-GB" b="1" dirty="0"/>
                     </a:p>
@@ -14659,11 +15097,19 @@
                       <a:pPr algn="ctr"/>
                       <a:r>
                         <a:rPr lang="en-GB" sz="1400" dirty="0" smtClean="0"/>
-                        <a:t>simple</a:t>
+                        <a:t>random (consistent with</a:t>
                       </a:r>
                       <a:r>
                         <a:rPr lang="en-GB" sz="1400" baseline="0" dirty="0" smtClean="0"/>
-                        <a:t> random</a:t>
+                        <a:t> </a:t>
+                      </a:r>
+                      <a:r>
+                        <a:rPr lang="en-GB" sz="1400" b="1" baseline="0" dirty="0" smtClean="0"/>
+                        <a:t>job</a:t>
+                      </a:r>
+                      <a:r>
+                        <a:rPr lang="en-GB" sz="1400" dirty="0" smtClean="0"/>
+                        <a:t>)</a:t>
                       </a:r>
                       <a:endParaRPr lang="en-GB" sz="1400" dirty="0"/>
                     </a:p>
@@ -14676,6 +15122,10 @@
                     <a:lstStyle/>
                     <a:p>
                       <a:pPr algn="ctr"/>
+                      <a:r>
+                        <a:rPr lang="en-GB" sz="1400" dirty="0" smtClean="0"/>
+                        <a:t>1</a:t>
+                      </a:r>
                       <a:endParaRPr lang="en-GB" sz="1400" dirty="0"/>
                     </a:p>
                   </a:txBody>
@@ -14687,7 +15137,11 @@
                     <a:lstStyle/>
                     <a:p>
                       <a:pPr algn="ctr"/>
-                      <a:endParaRPr lang="en-GB" sz="1400"/>
+                      <a:r>
+                        <a:rPr lang="en-GB" sz="1400" dirty="0" smtClean="0"/>
+                        <a:t>5</a:t>
+                      </a:r>
+                      <a:endParaRPr lang="en-GB" sz="1400" dirty="0"/>
                     </a:p>
                   </a:txBody>
                   <a:tcPr/>
@@ -14701,7 +15155,7 @@
                     <a:p>
                       <a:r>
                         <a:rPr lang="en-GB" b="1" dirty="0" smtClean="0"/>
-                        <a:t>Job-range</a:t>
+                        <a:t>Age</a:t>
                       </a:r>
                       <a:endParaRPr lang="en-GB" b="1" dirty="0"/>
                     </a:p>
@@ -14730,66 +15184,28 @@
                     <a:p>
                       <a:pPr algn="ctr"/>
                       <a:r>
+                        <a:rPr lang="en-GB" sz="1400" dirty="0" err="1" smtClean="0"/>
+                        <a:t>Min</a:t>
+                      </a:r>
+                      <a:r>
+                        <a:rPr lang="en-GB" sz="1400" baseline="0" dirty="0" err="1" smtClean="0"/>
+                        <a:t>_age</a:t>
+                      </a:r>
+                      <a:r>
                         <a:rPr lang="en-GB" sz="1400" dirty="0" smtClean="0"/>
-                        <a:t>30</a:t>
-                      </a:r>
-                      <a:endParaRPr lang="en-GB" sz="1400" dirty="0"/>
-                    </a:p>
-                  </a:txBody>
-                  <a:tcPr/>
-                </a:tc>
-                <a:tc>
-                  <a:txBody>
-                    <a:bodyPr/>
-                    <a:lstStyle/>
-                    <a:p>
-                      <a:pPr algn="ctr"/>
-                      <a:r>
-                        <a:rPr lang="en-GB" sz="1400" dirty="0" smtClean="0"/>
-                        <a:t>160</a:t>
-                      </a:r>
-                      <a:endParaRPr lang="en-GB" sz="1400" dirty="0"/>
-                    </a:p>
-                  </a:txBody>
-                  <a:tcPr/>
-                </a:tc>
-              </a:tr>
-              <a:tr h="370840">
-                <a:tc>
-                  <a:txBody>
-                    <a:bodyPr/>
-                    <a:lstStyle/>
-                    <a:p>
-                      <a:r>
-                        <a:rPr lang="en-GB" b="1" dirty="0" smtClean="0"/>
-                        <a:t>Skills</a:t>
-                      </a:r>
-                      <a:r>
-                        <a:rPr lang="en-GB" b="1" baseline="0" dirty="0" smtClean="0"/>
-                        <a:t> </a:t>
-                      </a:r>
-                      <a:endParaRPr lang="en-GB" b="1" dirty="0"/>
-                    </a:p>
-                  </a:txBody>
-                  <a:tcPr/>
-                </a:tc>
-                <a:tc>
-                  <a:txBody>
-                    <a:bodyPr/>
-                    <a:lstStyle/>
-                    <a:p>
-                      <a:pPr algn="ctr"/>
-                      <a:r>
-                        <a:rPr lang="en-GB" sz="1400" dirty="0" smtClean="0"/>
-                        <a:t>random (consistent with</a:t>
+                        <a:t>(from</a:t>
                       </a:r>
                       <a:r>
                         <a:rPr lang="en-GB" sz="1400" baseline="0" dirty="0" smtClean="0"/>
                         <a:t> </a:t>
                       </a:r>
                       <a:r>
+                        <a:rPr lang="en-GB" sz="1400" b="1" baseline="0" dirty="0" err="1" smtClean="0"/>
+                        <a:t>Edu</a:t>
+                      </a:r>
+                      <a:r>
                         <a:rPr lang="en-GB" sz="1400" b="1" baseline="0" dirty="0" smtClean="0"/>
-                        <a:t>job</a:t>
+                        <a:t>.</a:t>
                       </a:r>
                       <a:r>
                         <a:rPr lang="en-GB" sz="1400" dirty="0" smtClean="0"/>
@@ -14807,189 +15223,20 @@
                     <a:p>
                       <a:pPr algn="ctr"/>
                       <a:r>
-                        <a:rPr lang="en-GB" sz="1400" dirty="0" smtClean="0"/>
-                        <a:t>1</a:t>
-                      </a:r>
-                      <a:endParaRPr lang="en-GB" sz="1400" dirty="0"/>
-                    </a:p>
-                  </a:txBody>
-                  <a:tcPr/>
-                </a:tc>
-                <a:tc>
-                  <a:txBody>
-                    <a:bodyPr/>
-                    <a:lstStyle/>
-                    <a:p>
-                      <a:pPr algn="ctr"/>
-                      <a:r>
-                        <a:rPr lang="en-GB" sz="1400" dirty="0" smtClean="0"/>
-                        <a:t>5</a:t>
-                      </a:r>
-                      <a:endParaRPr lang="en-GB" sz="1400" dirty="0"/>
-                    </a:p>
-                  </a:txBody>
-                  <a:tcPr/>
-                </a:tc>
-              </a:tr>
-              <a:tr h="370840">
-                <a:tc>
-                  <a:txBody>
-                    <a:bodyPr/>
-                    <a:lstStyle/>
-                    <a:p>
-                      <a:r>
-                        <a:rPr lang="en-GB" b="1" dirty="0" smtClean="0"/>
-                        <a:t>Soft</a:t>
-                      </a:r>
-                      <a:r>
-                        <a:rPr lang="en-GB" b="1" baseline="0" dirty="0" smtClean="0"/>
-                        <a:t> skills</a:t>
-                      </a:r>
-                      <a:endParaRPr lang="en-GB" b="1" dirty="0"/>
-                    </a:p>
-                  </a:txBody>
-                  <a:tcPr/>
-                </a:tc>
-                <a:tc>
-                  <a:txBody>
-                    <a:bodyPr/>
-                    <a:lstStyle/>
-                    <a:p>
-                      <a:pPr algn="ctr"/>
-                      <a:r>
-                        <a:rPr lang="en-GB" sz="1400" dirty="0" smtClean="0"/>
-                        <a:t>random (consistent with</a:t>
+                        <a:rPr lang="en-GB" sz="1400" dirty="0" err="1" smtClean="0"/>
+                        <a:t>Max</a:t>
+                      </a:r>
+                      <a:r>
+                        <a:rPr lang="en-GB" sz="1400" baseline="0" dirty="0" err="1" smtClean="0"/>
+                        <a:t>_age</a:t>
                       </a:r>
                       <a:r>
                         <a:rPr lang="en-GB" sz="1400" baseline="0" dirty="0" smtClean="0"/>
                         <a:t> </a:t>
                       </a:r>
                       <a:r>
-                        <a:rPr lang="en-GB" sz="1400" b="1" baseline="0" dirty="0" smtClean="0"/>
-                        <a:t>job</a:t>
-                      </a:r>
-                      <a:r>
-                        <a:rPr lang="en-GB" sz="1400" dirty="0" smtClean="0"/>
-                        <a:t>)</a:t>
-                      </a:r>
-                      <a:endParaRPr lang="en-GB" sz="1400" dirty="0"/>
-                    </a:p>
-                  </a:txBody>
-                  <a:tcPr/>
-                </a:tc>
-                <a:tc>
-                  <a:txBody>
-                    <a:bodyPr/>
-                    <a:lstStyle/>
-                    <a:p>
-                      <a:pPr algn="ctr"/>
-                      <a:r>
-                        <a:rPr lang="en-GB" sz="1400" dirty="0" smtClean="0"/>
-                        <a:t>1</a:t>
-                      </a:r>
-                      <a:endParaRPr lang="en-GB" sz="1400" dirty="0"/>
-                    </a:p>
-                  </a:txBody>
-                  <a:tcPr/>
-                </a:tc>
-                <a:tc>
-                  <a:txBody>
-                    <a:bodyPr/>
-                    <a:lstStyle/>
-                    <a:p>
-                      <a:pPr algn="ctr"/>
-                      <a:r>
-                        <a:rPr lang="en-GB" sz="1400" dirty="0" smtClean="0"/>
-                        <a:t>5</a:t>
-                      </a:r>
-                      <a:endParaRPr lang="en-GB" sz="1400" dirty="0"/>
-                    </a:p>
-                  </a:txBody>
-                  <a:tcPr/>
-                </a:tc>
-              </a:tr>
-              <a:tr h="370840">
-                <a:tc>
-                  <a:txBody>
-                    <a:bodyPr/>
-                    <a:lstStyle/>
-                    <a:p>
-                      <a:r>
-                        <a:rPr lang="en-GB" b="1" dirty="0" smtClean="0"/>
-                        <a:t>Age</a:t>
-                      </a:r>
-                      <a:endParaRPr lang="en-GB" b="1" dirty="0"/>
-                    </a:p>
-                  </a:txBody>
-                  <a:tcPr/>
-                </a:tc>
-                <a:tc>
-                  <a:txBody>
-                    <a:bodyPr/>
-                    <a:lstStyle/>
-                    <a:p>
-                      <a:pPr algn="ctr"/>
-                      <a:r>
-                        <a:rPr lang="en-GB" sz="1400" dirty="0" smtClean="0"/>
-                        <a:t>random</a:t>
-                      </a:r>
-                      <a:endParaRPr lang="en-GB" sz="1400" dirty="0"/>
-                    </a:p>
-                  </a:txBody>
-                  <a:tcPr/>
-                </a:tc>
-                <a:tc>
-                  <a:txBody>
-                    <a:bodyPr/>
-                    <a:lstStyle/>
-                    <a:p>
-                      <a:pPr algn="ctr"/>
-                      <a:r>
-                        <a:rPr lang="en-GB" sz="1400" dirty="0" smtClean="0"/>
-                        <a:t>Min</a:t>
-                      </a:r>
-                      <a:r>
                         <a:rPr lang="en-GB" sz="1400" baseline="0" dirty="0" smtClean="0"/>
-                        <a:t> age</a:t>
-                      </a:r>
-                      <a:r>
-                        <a:rPr lang="en-GB" sz="1400" dirty="0" smtClean="0"/>
-                        <a:t>(from</a:t>
-                      </a:r>
-                      <a:r>
-                        <a:rPr lang="en-GB" sz="1400" baseline="0" dirty="0" smtClean="0"/>
-                        <a:t> </a:t>
-                      </a:r>
-                      <a:r>
-                        <a:rPr lang="en-GB" sz="1400" b="1" baseline="0" dirty="0" err="1" smtClean="0"/>
-                        <a:t>Edu</a:t>
-                      </a:r>
-                      <a:r>
-                        <a:rPr lang="en-GB" sz="1400" b="1" baseline="0" dirty="0" smtClean="0"/>
-                        <a:t>.</a:t>
-                      </a:r>
-                      <a:r>
-                        <a:rPr lang="en-GB" sz="1400" dirty="0" smtClean="0"/>
-                        <a:t>)</a:t>
-                      </a:r>
-                      <a:endParaRPr lang="en-GB" sz="1400" dirty="0"/>
-                    </a:p>
-                  </a:txBody>
-                  <a:tcPr/>
-                </a:tc>
-                <a:tc>
-                  <a:txBody>
-                    <a:bodyPr/>
-                    <a:lstStyle/>
-                    <a:p>
-                      <a:pPr algn="ctr"/>
-                      <a:r>
-                        <a:rPr lang="en-GB" sz="1400" dirty="0" smtClean="0"/>
-                        <a:t>Max</a:t>
-                      </a:r>
-                      <a:r>
-                        <a:rPr lang="en-GB" sz="1400" baseline="0" dirty="0" smtClean="0"/>
-                        <a:t> age (from </a:t>
+                        <a:t>(from </a:t>
                       </a:r>
                       <a:r>
                         <a:rPr lang="en-GB" sz="1400" baseline="0" dirty="0" err="1" smtClean="0"/>
@@ -15044,7 +15291,15 @@
                       </a:pPr>
                       <a:r>
                         <a:rPr lang="en-GB" sz="1400" dirty="0" smtClean="0"/>
-                        <a:t>(number) rnd </a:t>
+                        <a:t>(</a:t>
+                      </a:r>
+                      <a:r>
+                        <a:rPr lang="en-GB" sz="1400" dirty="0" smtClean="0"/>
+                        <a:t>number of language) </a:t>
+                      </a:r>
+                      <a:r>
+                        <a:rPr lang="en-GB" sz="1400" dirty="0" smtClean="0"/>
+                        <a:t>rnd </a:t>
                       </a:r>
                       <a:r>
                         <a:rPr lang="en-GB" sz="1400" baseline="0" dirty="0" smtClean="0"/>
@@ -15052,11 +15307,11 @@
                       </a:r>
                       <a:r>
                         <a:rPr lang="en-GB" sz="1400" baseline="0" dirty="0" err="1" smtClean="0"/>
-                        <a:t>dist</a:t>
+                        <a:t>distrib</a:t>
                       </a:r>
                       <a:r>
                         <a:rPr lang="en-GB" sz="1400" baseline="0" dirty="0" smtClean="0"/>
-                        <a:t> (</a:t>
+                        <a:t>. (</a:t>
                       </a:r>
                       <a:r>
                         <a:rPr lang="en-GB" sz="1400" kern="1200" dirty="0" smtClean="0">
@@ -15068,19 +15323,7 @@
                           <a:ea typeface="+mn-ea"/>
                           <a:cs typeface="+mn-cs"/>
                         </a:rPr>
-                        <a:t>0.7, 0.2, 0.1) +</a:t>
-                      </a:r>
-                      <a:r>
-                        <a:rPr lang="en-GB" sz="1400" kern="1200" baseline="0" dirty="0" smtClean="0">
-                          <a:solidFill>
-                            <a:schemeClr val="dk1"/>
-                          </a:solidFill>
-                          <a:effectLst/>
-                          <a:latin typeface="+mn-lt"/>
-                          <a:ea typeface="+mn-ea"/>
-                          <a:cs typeface="+mn-cs"/>
-                        </a:rPr>
-                        <a:t> </a:t>
+                        <a:t>0.7, 0.2, 0.1) </a:t>
                       </a:r>
                       <a:r>
                         <a:rPr lang="en-GB" sz="1400" kern="1200" dirty="0" smtClean="0">
@@ -15092,172 +15335,9 @@
                           <a:ea typeface="+mn-ea"/>
                           <a:cs typeface="+mn-cs"/>
                         </a:rPr>
-                        <a:t>(level) rnd</a:t>
-                      </a:r>
-                      <a:r>
-                        <a:rPr lang="en-GB" sz="1400" kern="1200" baseline="0" dirty="0" smtClean="0">
-                          <a:solidFill>
-                            <a:schemeClr val="dk1"/>
-                          </a:solidFill>
-                          <a:effectLst/>
-                          <a:latin typeface="+mn-lt"/>
-                          <a:ea typeface="+mn-ea"/>
-                          <a:cs typeface="+mn-cs"/>
-                        </a:rPr>
-                        <a:t> with </a:t>
-                      </a:r>
-                      <a:r>
-                        <a:rPr lang="en-GB" sz="1400" kern="1200" baseline="0" dirty="0" err="1" smtClean="0">
-                          <a:solidFill>
-                            <a:schemeClr val="dk1"/>
-                          </a:solidFill>
-                          <a:effectLst/>
-                          <a:latin typeface="+mn-lt"/>
-                          <a:ea typeface="+mn-ea"/>
-                          <a:cs typeface="+mn-cs"/>
-                        </a:rPr>
-                        <a:t>dist</a:t>
-                      </a:r>
-                      <a:endParaRPr lang="en-GB" sz="1400" kern="1200" dirty="0" smtClean="0">
-                        <a:solidFill>
-                          <a:schemeClr val="dk1"/>
-                        </a:solidFill>
-                        <a:effectLst/>
-                        <a:latin typeface="+mn-lt"/>
-                        <a:ea typeface="+mn-ea"/>
-                        <a:cs typeface="+mn-cs"/>
-                      </a:endParaRPr>
-                    </a:p>
-                  </a:txBody>
-                  <a:tcPr/>
-                </a:tc>
-                <a:tc>
-                  <a:txBody>
-                    <a:bodyPr/>
-                    <a:lstStyle/>
-                    <a:p>
-                      <a:pPr algn="ctr"/>
-                      <a:r>
-                        <a:rPr lang="en-GB" sz="1400" dirty="0" smtClean="0"/>
-                        <a:t>1</a:t>
-                      </a:r>
-                      <a:endParaRPr lang="en-GB" sz="1400" dirty="0"/>
-                    </a:p>
-                  </a:txBody>
-                  <a:tcPr/>
-                </a:tc>
-                <a:tc>
-                  <a:txBody>
-                    <a:bodyPr/>
-                    <a:lstStyle/>
-                    <a:p>
-                      <a:pPr algn="ctr"/>
-                      <a:r>
-                        <a:rPr lang="en-GB" sz="1400" dirty="0" smtClean="0"/>
-                        <a:t>3</a:t>
-                      </a:r>
-                      <a:endParaRPr lang="en-GB" sz="1400" dirty="0"/>
-                    </a:p>
-                  </a:txBody>
-                  <a:tcPr/>
-                </a:tc>
-              </a:tr>
-              <a:tr h="370840">
-                <a:tc>
-                  <a:txBody>
-                    <a:bodyPr/>
-                    <a:lstStyle/>
-                    <a:p>
-                      <a:r>
-                        <a:rPr lang="en-GB" b="1" dirty="0" smtClean="0"/>
-                        <a:t>Certificates</a:t>
-                      </a:r>
-                      <a:endParaRPr lang="en-GB" b="1" dirty="0"/>
-                    </a:p>
-                  </a:txBody>
-                  <a:tcPr/>
-                </a:tc>
-                <a:tc>
-                  <a:txBody>
-                    <a:bodyPr/>
-                    <a:lstStyle/>
-                    <a:p>
-                      <a:pPr algn="ctr"/>
-                      <a:r>
-                        <a:rPr lang="en-GB" sz="1400" dirty="0" smtClean="0"/>
-                        <a:t>Rnd with </a:t>
-                      </a:r>
-                      <a:r>
-                        <a:rPr lang="en-GB" sz="1400" dirty="0" err="1" smtClean="0"/>
-                        <a:t>distrb</a:t>
-                      </a:r>
-                      <a:r>
-                        <a:rPr lang="en-GB" sz="1400" dirty="0" smtClean="0"/>
-                        <a:t> (consistent with</a:t>
-                      </a:r>
-                      <a:r>
-                        <a:rPr lang="en-GB" sz="1400" baseline="0" dirty="0" smtClean="0"/>
-                        <a:t> job</a:t>
-                      </a:r>
-                      <a:r>
-                        <a:rPr lang="en-GB" sz="1400" dirty="0" smtClean="0"/>
-                        <a:t>)</a:t>
-                      </a:r>
-                      <a:endParaRPr lang="en-GB" sz="1400" dirty="0"/>
-                    </a:p>
-                  </a:txBody>
-                  <a:tcPr/>
-                </a:tc>
-                <a:tc>
-                  <a:txBody>
-                    <a:bodyPr/>
-                    <a:lstStyle/>
-                    <a:p>
-                      <a:pPr algn="ctr"/>
-                      <a:r>
-                        <a:rPr lang="en-GB" sz="1400" dirty="0" smtClean="0"/>
-                        <a:t>0</a:t>
-                      </a:r>
-                      <a:endParaRPr lang="en-GB" sz="1400" dirty="0"/>
-                    </a:p>
-                  </a:txBody>
-                  <a:tcPr/>
-                </a:tc>
-                <a:tc>
-                  <a:txBody>
-                    <a:bodyPr/>
-                    <a:lstStyle/>
-                    <a:p>
-                      <a:pPr algn="ctr"/>
-                      <a:r>
-                        <a:rPr lang="en-GB" sz="1400" dirty="0" smtClean="0"/>
-                        <a:t>3</a:t>
-                      </a:r>
-                      <a:endParaRPr lang="en-GB" sz="1400" dirty="0"/>
-                    </a:p>
-                  </a:txBody>
-                  <a:tcPr/>
-                </a:tc>
-              </a:tr>
-              <a:tr h="370840">
-                <a:tc>
-                  <a:txBody>
-                    <a:bodyPr/>
-                    <a:lstStyle/>
-                    <a:p>
-                      <a:r>
-                        <a:rPr lang="en-GB" b="1" dirty="0" smtClean="0"/>
-                        <a:t>Experience</a:t>
-                      </a:r>
-                      <a:endParaRPr lang="en-GB" b="1" dirty="0"/>
-                    </a:p>
-                  </a:txBody>
-                  <a:tcPr/>
-                </a:tc>
-                <a:tc>
-                  <a:txBody>
-                    <a:bodyPr/>
-                    <a:lstStyle/>
+                        <a:t>+</a:t>
+                      </a:r>
+                    </a:p>
                     <a:p>
                       <a:pPr marL="0" marR="0" indent="0" algn="ctr" defTabSz="914400" rtl="0" eaLnBrk="1" fontAlgn="auto" latinLnBrk="0" hangingPunct="1">
                         <a:lnSpc>
@@ -15277,6 +15357,208 @@
                         <a:defRPr/>
                       </a:pPr>
                       <a:r>
+                        <a:rPr lang="en-GB" sz="1400" kern="1200" baseline="0" dirty="0" smtClean="0">
+                          <a:solidFill>
+                            <a:schemeClr val="dk1"/>
+                          </a:solidFill>
+                          <a:effectLst/>
+                          <a:latin typeface="+mn-lt"/>
+                          <a:ea typeface="+mn-ea"/>
+                          <a:cs typeface="+mn-cs"/>
+                        </a:rPr>
+                        <a:t> </a:t>
+                      </a:r>
+                      <a:r>
+                        <a:rPr lang="en-GB" sz="1400" kern="1200" dirty="0" smtClean="0">
+                          <a:solidFill>
+                            <a:schemeClr val="dk1"/>
+                          </a:solidFill>
+                          <a:effectLst/>
+                          <a:latin typeface="+mn-lt"/>
+                          <a:ea typeface="+mn-ea"/>
+                          <a:cs typeface="+mn-cs"/>
+                        </a:rPr>
+                        <a:t>(level) rnd</a:t>
+                      </a:r>
+                      <a:r>
+                        <a:rPr lang="en-GB" sz="1400" kern="1200" baseline="0" dirty="0" smtClean="0">
+                          <a:solidFill>
+                            <a:schemeClr val="dk1"/>
+                          </a:solidFill>
+                          <a:effectLst/>
+                          <a:latin typeface="+mn-lt"/>
+                          <a:ea typeface="+mn-ea"/>
+                          <a:cs typeface="+mn-cs"/>
+                        </a:rPr>
+                        <a:t> with </a:t>
+                      </a:r>
+                      <a:r>
+                        <a:rPr lang="en-GB" sz="1400" baseline="0" dirty="0" smtClean="0"/>
+                        <a:t>distribution</a:t>
+                      </a:r>
+                      <a:endParaRPr lang="en-GB" sz="1400" kern="1200" dirty="0" smtClean="0">
+                        <a:solidFill>
+                          <a:schemeClr val="dk1"/>
+                        </a:solidFill>
+                        <a:effectLst/>
+                        <a:latin typeface="+mn-lt"/>
+                        <a:ea typeface="+mn-ea"/>
+                        <a:cs typeface="+mn-cs"/>
+                      </a:endParaRPr>
+                    </a:p>
+                  </a:txBody>
+                  <a:tcPr/>
+                </a:tc>
+                <a:tc>
+                  <a:txBody>
+                    <a:bodyPr/>
+                    <a:lstStyle/>
+                    <a:p>
+                      <a:pPr algn="ctr"/>
+                      <a:r>
+                        <a:rPr lang="en-GB" sz="1400" dirty="0" smtClean="0"/>
+                        <a:t>1</a:t>
+                      </a:r>
+                      <a:endParaRPr lang="en-GB" sz="1400" dirty="0"/>
+                    </a:p>
+                  </a:txBody>
+                  <a:tcPr/>
+                </a:tc>
+                <a:tc>
+                  <a:txBody>
+                    <a:bodyPr/>
+                    <a:lstStyle/>
+                    <a:p>
+                      <a:pPr algn="ctr"/>
+                      <a:r>
+                        <a:rPr lang="en-GB" sz="1400" dirty="0" smtClean="0"/>
+                        <a:t>3</a:t>
+                      </a:r>
+                      <a:endParaRPr lang="en-GB" sz="1400" dirty="0"/>
+                    </a:p>
+                  </a:txBody>
+                  <a:tcPr/>
+                </a:tc>
+              </a:tr>
+              <a:tr h="370840">
+                <a:tc>
+                  <a:txBody>
+                    <a:bodyPr/>
+                    <a:lstStyle/>
+                    <a:p>
+                      <a:r>
+                        <a:rPr lang="en-GB" b="1" dirty="0" smtClean="0"/>
+                        <a:t>Certificates</a:t>
+                      </a:r>
+                      <a:endParaRPr lang="en-GB" b="1" dirty="0"/>
+                    </a:p>
+                  </a:txBody>
+                  <a:tcPr/>
+                </a:tc>
+                <a:tc>
+                  <a:txBody>
+                    <a:bodyPr/>
+                    <a:lstStyle/>
+                    <a:p>
+                      <a:pPr algn="ctr"/>
+                      <a:r>
+                        <a:rPr lang="en-GB" sz="1400" dirty="0" smtClean="0"/>
+                        <a:t>Rnd with </a:t>
+                      </a:r>
+                      <a:r>
+                        <a:rPr lang="en-GB" sz="1400" baseline="0" dirty="0" smtClean="0"/>
+                        <a:t>distribution </a:t>
+                      </a:r>
+                      <a:r>
+                        <a:rPr lang="en-GB" sz="1400" dirty="0" smtClean="0"/>
+                        <a:t>(</a:t>
+                      </a:r>
+                      <a:r>
+                        <a:rPr lang="en-GB" sz="1400" dirty="0" smtClean="0"/>
+                        <a:t>consistent with</a:t>
+                      </a:r>
+                      <a:r>
+                        <a:rPr lang="en-GB" sz="1400" baseline="0" dirty="0" smtClean="0"/>
+                        <a:t> job</a:t>
+                      </a:r>
+                      <a:r>
+                        <a:rPr lang="en-GB" sz="1400" dirty="0" smtClean="0"/>
+                        <a:t>)</a:t>
+                      </a:r>
+                      <a:endParaRPr lang="en-GB" sz="1400" dirty="0"/>
+                    </a:p>
+                  </a:txBody>
+                  <a:tcPr/>
+                </a:tc>
+                <a:tc>
+                  <a:txBody>
+                    <a:bodyPr/>
+                    <a:lstStyle/>
+                    <a:p>
+                      <a:pPr algn="ctr"/>
+                      <a:r>
+                        <a:rPr lang="en-GB" sz="1400" dirty="0" smtClean="0"/>
+                        <a:t>0</a:t>
+                      </a:r>
+                      <a:endParaRPr lang="en-GB" sz="1400" dirty="0"/>
+                    </a:p>
+                  </a:txBody>
+                  <a:tcPr/>
+                </a:tc>
+                <a:tc>
+                  <a:txBody>
+                    <a:bodyPr/>
+                    <a:lstStyle/>
+                    <a:p>
+                      <a:pPr algn="ctr"/>
+                      <a:r>
+                        <a:rPr lang="en-GB" sz="1400" dirty="0" smtClean="0"/>
+                        <a:t>3</a:t>
+                      </a:r>
+                      <a:endParaRPr lang="en-GB" sz="1400" dirty="0"/>
+                    </a:p>
+                  </a:txBody>
+                  <a:tcPr/>
+                </a:tc>
+              </a:tr>
+              <a:tr h="370840">
+                <a:tc>
+                  <a:txBody>
+                    <a:bodyPr/>
+                    <a:lstStyle/>
+                    <a:p>
+                      <a:r>
+                        <a:rPr lang="en-GB" b="1" dirty="0" smtClean="0"/>
+                        <a:t>Experience</a:t>
+                      </a:r>
+                      <a:endParaRPr lang="en-GB" b="1" dirty="0"/>
+                    </a:p>
+                  </a:txBody>
+                  <a:tcPr/>
+                </a:tc>
+                <a:tc>
+                  <a:txBody>
+                    <a:bodyPr/>
+                    <a:lstStyle/>
+                    <a:p>
+                      <a:pPr marL="0" marR="0" indent="0" algn="ctr" defTabSz="914400" rtl="0" eaLnBrk="1" fontAlgn="auto" latinLnBrk="0" hangingPunct="1">
+                        <a:lnSpc>
+                          <a:spcPct val="100000"/>
+                        </a:lnSpc>
+                        <a:spcBef>
+                          <a:spcPts val="0"/>
+                        </a:spcBef>
+                        <a:spcAft>
+                          <a:spcPts val="0"/>
+                        </a:spcAft>
+                        <a:buClrTx/>
+                        <a:buSzTx/>
+                        <a:buFontTx/>
+                        <a:buNone/>
+                        <a:tabLst/>
+                        <a:defRPr/>
+                      </a:pPr>
+                      <a:r>
                         <a:rPr lang="en-GB" sz="1400" dirty="0" smtClean="0"/>
                         <a:t>Min(</a:t>
                       </a:r>
@@ -15294,11 +15576,15 @@
                       </a:r>
                       <a:r>
                         <a:rPr lang="en-GB" sz="1400" b="0" dirty="0" smtClean="0"/>
-                        <a:t>- min</a:t>
-                      </a:r>
-                      <a:r>
-                        <a:rPr lang="en-GB" sz="1400" b="0" baseline="0" dirty="0" smtClean="0"/>
-                        <a:t> age</a:t>
+                        <a:t>– </a:t>
+                      </a:r>
+                      <a:r>
+                        <a:rPr lang="en-GB" sz="1400" b="0" dirty="0" err="1" smtClean="0"/>
+                        <a:t>min</a:t>
+                      </a:r>
+                      <a:r>
+                        <a:rPr lang="en-GB" sz="1400" b="0" baseline="0" dirty="0" err="1" smtClean="0"/>
+                        <a:t>_age</a:t>
                       </a:r>
                       <a:r>
                         <a:rPr lang="en-GB" sz="1400" dirty="0" smtClean="0"/>
@@ -15629,7 +15915,7 @@
             <p:ph idx="1"/>
             <p:extLst>
               <p:ext uri="{D42A27DB-BD31-4B8C-83A1-F6EECF244321}">
-                <p14:modId xmlns:p14="http://schemas.microsoft.com/office/powerpoint/2010/main" val="1186413892"/>
+                <p14:modId xmlns:p14="http://schemas.microsoft.com/office/powerpoint/2010/main" val="1921268049"/>
               </p:ext>
             </p:extLst>
           </p:nvPr>
@@ -15772,19 +16058,27 @@
                       <a:pPr algn="ctr"/>
                       <a:r>
                         <a:rPr lang="en-GB" sz="1400" dirty="0" smtClean="0"/>
-                        <a:t>rnd</a:t>
+                        <a:t>Random from</a:t>
+                      </a:r>
+                      <a:r>
+                        <a:rPr lang="en-GB" sz="1400" baseline="0" dirty="0" smtClean="0"/>
+                        <a:t> distribution </a:t>
+                      </a:r>
+                      <a:r>
+                        <a:rPr lang="en-GB" sz="1400" dirty="0" smtClean="0"/>
+                        <a:t>(consistent with</a:t>
                       </a:r>
                       <a:r>
                         <a:rPr lang="en-GB" sz="1400" baseline="0" dirty="0" smtClean="0"/>
                         <a:t> </a:t>
                       </a:r>
                       <a:r>
+                        <a:rPr lang="en-GB" sz="1400" b="1" baseline="0" dirty="0" smtClean="0"/>
+                        <a:t>job</a:t>
+                      </a:r>
+                      <a:r>
                         <a:rPr lang="en-GB" sz="1400" dirty="0" smtClean="0"/>
-                        <a:t>from</a:t>
-                      </a:r>
-                      <a:r>
-                        <a:rPr lang="en-GB" sz="1400" baseline="0" dirty="0" smtClean="0"/>
-                        <a:t> distribution</a:t>
+                        <a:t>)</a:t>
                       </a:r>
                       <a:endParaRPr lang="en-GB" sz="1400" dirty="0"/>
                     </a:p>
@@ -15902,7 +16196,11 @@
                       </a:r>
                       <a:r>
                         <a:rPr lang="en-GB" sz="1400" baseline="0" dirty="0" smtClean="0"/>
-                        <a:t> job</a:t>
+                        <a:t> </a:t>
+                      </a:r>
+                      <a:r>
+                        <a:rPr lang="en-GB" sz="1400" b="1" baseline="0" dirty="0" smtClean="0"/>
+                        <a:t>job</a:t>
                       </a:r>
                       <a:r>
                         <a:rPr lang="en-GB" sz="1400" dirty="0" smtClean="0"/>
@@ -15975,7 +16273,11 @@
                       </a:r>
                       <a:r>
                         <a:rPr lang="en-GB" sz="1400" baseline="0" dirty="0" smtClean="0"/>
-                        <a:t> job</a:t>
+                        <a:t> </a:t>
+                      </a:r>
+                      <a:r>
+                        <a:rPr lang="en-GB" sz="1400" b="1" baseline="0" dirty="0" smtClean="0"/>
+                        <a:t>job</a:t>
                       </a:r>
                       <a:r>
                         <a:rPr lang="en-GB" sz="1400" dirty="0" smtClean="0"/>
@@ -16228,7 +16530,7 @@
                       </a:pPr>
                       <a:r>
                         <a:rPr lang="en-GB" sz="1400" dirty="0" smtClean="0"/>
-                        <a:t>(number) rnd </a:t>
+                        <a:t>(number of language) rnd </a:t>
                       </a:r>
                       <a:r>
                         <a:rPr lang="en-GB" sz="1400" baseline="0" dirty="0" smtClean="0"/>
@@ -16236,11 +16538,11 @@
                       </a:r>
                       <a:r>
                         <a:rPr lang="en-GB" sz="1400" baseline="0" dirty="0" err="1" smtClean="0"/>
-                        <a:t>dist</a:t>
+                        <a:t>distrib</a:t>
                       </a:r>
                       <a:r>
                         <a:rPr lang="en-GB" sz="1400" baseline="0" dirty="0" smtClean="0"/>
-                        <a:t> (</a:t>
+                        <a:t>. (</a:t>
                       </a:r>
                       <a:r>
                         <a:rPr lang="en-GB" sz="1400" kern="1200" dirty="0" smtClean="0">
@@ -16254,6 +16556,25 @@
                         </a:rPr>
                         <a:t>0.7, 0.2, 0.1) +</a:t>
                       </a:r>
+                    </a:p>
+                    <a:p>
+                      <a:pPr marL="0" marR="0" indent="0" algn="ctr" defTabSz="914400" rtl="0" eaLnBrk="1" fontAlgn="auto" latinLnBrk="0" hangingPunct="1">
+                        <a:lnSpc>
+                          <a:spcPct val="100000"/>
+                        </a:lnSpc>
+                        <a:spcBef>
+                          <a:spcPts val="0"/>
+                        </a:spcBef>
+                        <a:spcAft>
+                          <a:spcPts val="0"/>
+                        </a:spcAft>
+                        <a:buClrTx/>
+                        <a:buSzTx/>
+                        <a:buFontTx/>
+                        <a:buNone/>
+                        <a:tabLst/>
+                        <a:defRPr/>
+                      </a:pPr>
                       <a:r>
                         <a:rPr lang="en-GB" sz="1400" kern="1200" baseline="0" dirty="0" smtClean="0">
                           <a:solidFill>
@@ -16291,16 +16612,8 @@
                         <a:t> with </a:t>
                       </a:r>
                       <a:r>
-                        <a:rPr lang="en-GB" sz="1400" kern="1200" baseline="0" dirty="0" err="1" smtClean="0">
-                          <a:solidFill>
-                            <a:schemeClr val="dk1"/>
-                          </a:solidFill>
-                          <a:effectLst/>
-                          <a:latin typeface="+mn-lt"/>
-                          <a:ea typeface="+mn-ea"/>
-                          <a:cs typeface="+mn-cs"/>
-                        </a:rPr>
-                        <a:t>dist</a:t>
+                        <a:rPr lang="en-GB" sz="1400" baseline="0" dirty="0" smtClean="0"/>
+                        <a:t>distribution</a:t>
                       </a:r>
                       <a:endParaRPr lang="en-GB" sz="1400" kern="1200" dirty="0" smtClean="0">
                         <a:solidFill>
@@ -16372,16 +16685,24 @@
                         <a:t>Rnd with </a:t>
                       </a:r>
                       <a:r>
-                        <a:rPr lang="en-GB" sz="1400" dirty="0" err="1" smtClean="0"/>
-                        <a:t>distrb</a:t>
+                        <a:rPr lang="en-GB" sz="1400" baseline="0" dirty="0" smtClean="0"/>
+                        <a:t>distribution </a:t>
                       </a:r>
                       <a:r>
                         <a:rPr lang="en-GB" sz="1400" dirty="0" smtClean="0"/>
-                        <a:t> (consistent with</a:t>
+                        <a:t>(</a:t>
+                      </a:r>
+                      <a:r>
+                        <a:rPr lang="en-GB" sz="1400" dirty="0" smtClean="0"/>
+                        <a:t>consistent with</a:t>
                       </a:r>
                       <a:r>
                         <a:rPr lang="en-GB" sz="1400" baseline="0" dirty="0" smtClean="0"/>
-                        <a:t> job</a:t>
+                        <a:t> </a:t>
+                      </a:r>
+                      <a:r>
+                        <a:rPr lang="en-GB" sz="1400" b="1" baseline="0" dirty="0" smtClean="0"/>
+                        <a:t>job</a:t>
                       </a:r>
                       <a:r>
                         <a:rPr lang="en-GB" sz="1400" dirty="0" smtClean="0"/>

</xml_diff>